<commit_message>
MLOps WDS updated version
</commit_message>
<xml_diff>
--- a/MCW-MLOps/Whiteboard design session/WDS trainer presentation - MLOps.pptx
+++ b/MCW-MLOps/Whiteboard design session/WDS trainer presentation - MLOps.pptx
@@ -6,7 +6,7 @@
     <p:sldMasterId id="2147483665" r:id="rId5"/>
   </p:sldMasterIdLst>
   <p:notesMasterIdLst>
-    <p:notesMasterId r:id="rId35"/>
+    <p:notesMasterId r:id="rId38"/>
   </p:notesMasterIdLst>
   <p:sldIdLst>
     <p:sldId id="300" r:id="rId6"/>
@@ -36,8 +36,11 @@
     <p:sldId id="336" r:id="rId30"/>
     <p:sldId id="337" r:id="rId31"/>
     <p:sldId id="319" r:id="rId32"/>
-    <p:sldId id="338" r:id="rId33"/>
-    <p:sldId id="318" r:id="rId34"/>
+    <p:sldId id="339" r:id="rId33"/>
+    <p:sldId id="338" r:id="rId34"/>
+    <p:sldId id="340" r:id="rId35"/>
+    <p:sldId id="341" r:id="rId36"/>
+    <p:sldId id="318" r:id="rId37"/>
   </p:sldIdLst>
   <p:sldSz cx="12192000" cy="6858000"/>
   <p:notesSz cx="6858000" cy="9144000"/>
@@ -147,8 +150,8 @@
 <file path=ppt/revisionInfo.xml><?xml version="1.0" encoding="utf-8"?>
 <p1510:revInfo xmlns:a="http://schemas.openxmlformats.org/drawingml/2006/main" xmlns:r="http://schemas.openxmlformats.org/officeDocument/2006/relationships" xmlns:p1510="http://schemas.microsoft.com/office/powerpoint/2015/10/main">
   <p1510:revLst>
+    <p1510:client id="{5F159153-6972-4091-9728-9592CD7B1E22}" v="1" dt="2018-06-29T19:57:36.034"/>
     <p1510:client id="{738DBAC3-60A1-4913-A600-E1113DEB827D}" v="37" dt="2018-05-10T17:30:28.024"/>
-    <p1510:client id="{5F159153-6972-4091-9728-9592CD7B1E22}" v="1" dt="2018-06-29T19:57:36.034"/>
   </p1510:revLst>
 </p1510:revInfo>
 </file>
@@ -235,7 +238,7 @@
           <a:p>
             <a:fld id="{52A13B17-C506-4D51-BB37-16B365906619}" type="datetimeFigureOut">
               <a:rPr lang="en-US" smtClean="0"/>
-              <a:t>6/19/2019</a:t>
+              <a:t>11/7/2019</a:t>
             </a:fld>
             <a:endParaRPr lang="en-US"/>
           </a:p>
@@ -2504,7 +2507,7 @@
     </p:spTree>
     <p:extLst>
       <p:ext uri="{BB962C8B-B14F-4D97-AF65-F5344CB8AC3E}">
-        <p14:creationId xmlns:p14="http://schemas.microsoft.com/office/powerpoint/2010/main" val="309923162"/>
+        <p14:creationId xmlns:p14="http://schemas.microsoft.com/office/powerpoint/2010/main" val="3306256856"/>
       </p:ext>
     </p:extLst>
   </p:cSld>
@@ -2588,7 +2591,7 @@
     </p:spTree>
     <p:extLst>
       <p:ext uri="{BB962C8B-B14F-4D97-AF65-F5344CB8AC3E}">
-        <p14:creationId xmlns:p14="http://schemas.microsoft.com/office/powerpoint/2010/main" val="671285550"/>
+        <p14:creationId xmlns:p14="http://schemas.microsoft.com/office/powerpoint/2010/main" val="309923162"/>
       </p:ext>
     </p:extLst>
   </p:cSld>
@@ -2673,6 +2676,258 @@
     <p:extLst>
       <p:ext uri="{BB962C8B-B14F-4D97-AF65-F5344CB8AC3E}">
         <p14:creationId xmlns:p14="http://schemas.microsoft.com/office/powerpoint/2010/main" val="1812498391"/>
+      </p:ext>
+    </p:extLst>
+  </p:cSld>
+  <p:clrMapOvr>
+    <a:masterClrMapping/>
+  </p:clrMapOvr>
+</p:notes>
+</file>
+
+<file path=ppt/notesSlides/notesSlide30.xml><?xml version="1.0" encoding="utf-8"?>
+<p:notes xmlns:a="http://schemas.openxmlformats.org/drawingml/2006/main" xmlns:r="http://schemas.openxmlformats.org/officeDocument/2006/relationships" xmlns:p="http://schemas.openxmlformats.org/presentationml/2006/main">
+  <p:cSld>
+    <p:spTree>
+      <p:nvGrpSpPr>
+        <p:cNvPr id="1" name=""/>
+        <p:cNvGrpSpPr/>
+        <p:nvPr/>
+      </p:nvGrpSpPr>
+      <p:grpSpPr>
+        <a:xfrm>
+          <a:off x="0" y="0"/>
+          <a:ext cx="0" cy="0"/>
+          <a:chOff x="0" y="0"/>
+          <a:chExt cx="0" cy="0"/>
+        </a:xfrm>
+      </p:grpSpPr>
+      <p:sp>
+        <p:nvSpPr>
+          <p:cNvPr id="2" name="Slide Image Placeholder 1"/>
+          <p:cNvSpPr>
+            <a:spLocks noGrp="1" noRot="1" noChangeAspect="1"/>
+          </p:cNvSpPr>
+          <p:nvPr>
+            <p:ph type="sldImg"/>
+          </p:nvPr>
+        </p:nvSpPr>
+        <p:spPr/>
+      </p:sp>
+      <p:sp>
+        <p:nvSpPr>
+          <p:cNvPr id="3" name="Notes Placeholder 2"/>
+          <p:cNvSpPr>
+            <a:spLocks noGrp="1"/>
+          </p:cNvSpPr>
+          <p:nvPr>
+            <p:ph type="body" idx="1"/>
+          </p:nvPr>
+        </p:nvSpPr>
+        <p:spPr/>
+        <p:txBody>
+          <a:bodyPr/>
+          <a:lstStyle/>
+          <a:p>
+            <a:endParaRPr lang="en-US"/>
+          </a:p>
+        </p:txBody>
+      </p:sp>
+      <p:sp>
+        <p:nvSpPr>
+          <p:cNvPr id="4" name="Slide Number Placeholder 3"/>
+          <p:cNvSpPr>
+            <a:spLocks noGrp="1"/>
+          </p:cNvSpPr>
+          <p:nvPr>
+            <p:ph type="sldNum" sz="quarter" idx="10"/>
+          </p:nvPr>
+        </p:nvSpPr>
+        <p:spPr/>
+        <p:txBody>
+          <a:bodyPr/>
+          <a:lstStyle/>
+          <a:p>
+            <a:fld id="{0998D5BB-B127-481F-BC0A-2F77C576BB34}" type="slidenum">
+              <a:rPr lang="en-US" smtClean="0"/>
+              <a:t>30</a:t>
+            </a:fld>
+            <a:endParaRPr lang="en-US"/>
+          </a:p>
+        </p:txBody>
+      </p:sp>
+    </p:spTree>
+    <p:extLst>
+      <p:ext uri="{BB962C8B-B14F-4D97-AF65-F5344CB8AC3E}">
+        <p14:creationId xmlns:p14="http://schemas.microsoft.com/office/powerpoint/2010/main" val="4154849814"/>
+      </p:ext>
+    </p:extLst>
+  </p:cSld>
+  <p:clrMapOvr>
+    <a:masterClrMapping/>
+  </p:clrMapOvr>
+</p:notes>
+</file>
+
+<file path=ppt/notesSlides/notesSlide31.xml><?xml version="1.0" encoding="utf-8"?>
+<p:notes xmlns:a="http://schemas.openxmlformats.org/drawingml/2006/main" xmlns:r="http://schemas.openxmlformats.org/officeDocument/2006/relationships" xmlns:p="http://schemas.openxmlformats.org/presentationml/2006/main">
+  <p:cSld>
+    <p:spTree>
+      <p:nvGrpSpPr>
+        <p:cNvPr id="1" name=""/>
+        <p:cNvGrpSpPr/>
+        <p:nvPr/>
+      </p:nvGrpSpPr>
+      <p:grpSpPr>
+        <a:xfrm>
+          <a:off x="0" y="0"/>
+          <a:ext cx="0" cy="0"/>
+          <a:chOff x="0" y="0"/>
+          <a:chExt cx="0" cy="0"/>
+        </a:xfrm>
+      </p:grpSpPr>
+      <p:sp>
+        <p:nvSpPr>
+          <p:cNvPr id="2" name="Slide Image Placeholder 1"/>
+          <p:cNvSpPr>
+            <a:spLocks noGrp="1" noRot="1" noChangeAspect="1"/>
+          </p:cNvSpPr>
+          <p:nvPr>
+            <p:ph type="sldImg"/>
+          </p:nvPr>
+        </p:nvSpPr>
+        <p:spPr/>
+      </p:sp>
+      <p:sp>
+        <p:nvSpPr>
+          <p:cNvPr id="3" name="Notes Placeholder 2"/>
+          <p:cNvSpPr>
+            <a:spLocks noGrp="1"/>
+          </p:cNvSpPr>
+          <p:nvPr>
+            <p:ph type="body" idx="1"/>
+          </p:nvPr>
+        </p:nvSpPr>
+        <p:spPr/>
+        <p:txBody>
+          <a:bodyPr/>
+          <a:lstStyle/>
+          <a:p>
+            <a:endParaRPr lang="en-US"/>
+          </a:p>
+        </p:txBody>
+      </p:sp>
+      <p:sp>
+        <p:nvSpPr>
+          <p:cNvPr id="4" name="Slide Number Placeholder 3"/>
+          <p:cNvSpPr>
+            <a:spLocks noGrp="1"/>
+          </p:cNvSpPr>
+          <p:nvPr>
+            <p:ph type="sldNum" sz="quarter" idx="10"/>
+          </p:nvPr>
+        </p:nvSpPr>
+        <p:spPr/>
+        <p:txBody>
+          <a:bodyPr/>
+          <a:lstStyle/>
+          <a:p>
+            <a:fld id="{0998D5BB-B127-481F-BC0A-2F77C576BB34}" type="slidenum">
+              <a:rPr lang="en-US" smtClean="0"/>
+              <a:t>31</a:t>
+            </a:fld>
+            <a:endParaRPr lang="en-US"/>
+          </a:p>
+        </p:txBody>
+      </p:sp>
+    </p:spTree>
+    <p:extLst>
+      <p:ext uri="{BB962C8B-B14F-4D97-AF65-F5344CB8AC3E}">
+        <p14:creationId xmlns:p14="http://schemas.microsoft.com/office/powerpoint/2010/main" val="4223089480"/>
+      </p:ext>
+    </p:extLst>
+  </p:cSld>
+  <p:clrMapOvr>
+    <a:masterClrMapping/>
+  </p:clrMapOvr>
+</p:notes>
+</file>
+
+<file path=ppt/notesSlides/notesSlide32.xml><?xml version="1.0" encoding="utf-8"?>
+<p:notes xmlns:a="http://schemas.openxmlformats.org/drawingml/2006/main" xmlns:r="http://schemas.openxmlformats.org/officeDocument/2006/relationships" xmlns:p="http://schemas.openxmlformats.org/presentationml/2006/main">
+  <p:cSld>
+    <p:spTree>
+      <p:nvGrpSpPr>
+        <p:cNvPr id="1" name=""/>
+        <p:cNvGrpSpPr/>
+        <p:nvPr/>
+      </p:nvGrpSpPr>
+      <p:grpSpPr>
+        <a:xfrm>
+          <a:off x="0" y="0"/>
+          <a:ext cx="0" cy="0"/>
+          <a:chOff x="0" y="0"/>
+          <a:chExt cx="0" cy="0"/>
+        </a:xfrm>
+      </p:grpSpPr>
+      <p:sp>
+        <p:nvSpPr>
+          <p:cNvPr id="2" name="Slide Image Placeholder 1"/>
+          <p:cNvSpPr>
+            <a:spLocks noGrp="1" noRot="1" noChangeAspect="1"/>
+          </p:cNvSpPr>
+          <p:nvPr>
+            <p:ph type="sldImg"/>
+          </p:nvPr>
+        </p:nvSpPr>
+        <p:spPr/>
+      </p:sp>
+      <p:sp>
+        <p:nvSpPr>
+          <p:cNvPr id="3" name="Notes Placeholder 2"/>
+          <p:cNvSpPr>
+            <a:spLocks noGrp="1"/>
+          </p:cNvSpPr>
+          <p:nvPr>
+            <p:ph type="body" idx="1"/>
+          </p:nvPr>
+        </p:nvSpPr>
+        <p:spPr/>
+        <p:txBody>
+          <a:bodyPr/>
+          <a:lstStyle/>
+          <a:p>
+            <a:endParaRPr lang="en-US"/>
+          </a:p>
+        </p:txBody>
+      </p:sp>
+      <p:sp>
+        <p:nvSpPr>
+          <p:cNvPr id="4" name="Slide Number Placeholder 3"/>
+          <p:cNvSpPr>
+            <a:spLocks noGrp="1"/>
+          </p:cNvSpPr>
+          <p:nvPr>
+            <p:ph type="sldNum" sz="quarter" idx="10"/>
+          </p:nvPr>
+        </p:nvSpPr>
+        <p:spPr/>
+        <p:txBody>
+          <a:bodyPr/>
+          <a:lstStyle/>
+          <a:p>
+            <a:fld id="{0998D5BB-B127-481F-BC0A-2F77C576BB34}" type="slidenum">
+              <a:rPr lang="en-US" smtClean="0"/>
+              <a:t>32</a:t>
+            </a:fld>
+            <a:endParaRPr lang="en-US"/>
+          </a:p>
+        </p:txBody>
+      </p:sp>
+    </p:spTree>
+    <p:extLst>
+      <p:ext uri="{BB962C8B-B14F-4D97-AF65-F5344CB8AC3E}">
+        <p14:creationId xmlns:p14="http://schemas.microsoft.com/office/powerpoint/2010/main" val="671285550"/>
       </p:ext>
     </p:extLst>
   </p:cSld>
@@ -3441,7 +3696,7 @@
       </p:transition>
     </mc:Fallback>
   </mc:AlternateContent>
-  <p:extLst mod="1">
+  <p:extLst>
     <p:ext uri="{DCECCB84-F9BA-43D5-87BE-67443E8EF086}">
       <p15:sldGuideLst xmlns:p15="http://schemas.microsoft.com/office/powerpoint/2012/main">
         <p15:guide id="1" pos="288">
@@ -14447,7 +14702,7 @@
       </a:lvl9pPr>
     </p:otherStyle>
   </p:txStyles>
-  <p:extLst mod="1">
+  <p:extLst>
     <p:ext uri="{27BBF7A9-308A-43DC-89C8-2F10F3537804}">
       <p15:sldGuideLst xmlns:p15="http://schemas.microsoft.com/office/powerpoint/2012/main">
         <p15:guide id="1" orient="horz" pos="187">
@@ -15062,7 +15317,7 @@
       </a:lvl9pPr>
     </p:otherStyle>
   </p:txStyles>
-  <p:extLst mod="1">
+  <p:extLst>
     <p:ext uri="{27BBF7A9-308A-43DC-89C8-2F10F3537804}">
       <p15:sldGuideLst xmlns:p15="http://schemas.microsoft.com/office/powerpoint/2012/main">
         <p15:guide id="1" orient="horz" pos="187">
@@ -19341,19 +19596,67 @@
               <a:buNone/>
             </a:pPr>
             <a:r>
-              <a:rPr lang="en-US" sz="2400" i="1" dirty="0">
+              <a:rPr lang="en-US" sz="1600" i="1" dirty="0">
                 <a:solidFill>
                   <a:schemeClr val="tx1"/>
                 </a:solidFill>
               </a:rPr>
-              <a:t>1.  We are not clear about the benefits that using ONNX might bring to our current scenario and future scenario.</a:t>
+              <a:t>1.  We are not clear about the benefits that using ONNX might bring to our current scenario and future scenario. Also, we are confused about the various choices that seem to be available like Python vs. ML.NET, or </a:t>
+            </a:r>
+            <a:r>
+              <a:rPr lang="en-US" sz="1600" i="1" dirty="0" err="1">
+                <a:solidFill>
+                  <a:schemeClr val="tx1"/>
+                </a:solidFill>
+              </a:rPr>
+              <a:t>Keras</a:t>
+            </a:r>
+            <a:r>
+              <a:rPr lang="en-US" sz="1600" i="1" dirty="0">
+                <a:solidFill>
+                  <a:schemeClr val="tx1"/>
+                </a:solidFill>
+              </a:rPr>
+              <a:t>/</a:t>
+            </a:r>
+            <a:r>
+              <a:rPr lang="en-US" sz="1600" i="1" dirty="0" err="1">
+                <a:solidFill>
+                  <a:schemeClr val="tx1"/>
+                </a:solidFill>
+              </a:rPr>
+              <a:t>Tensorflow</a:t>
+            </a:r>
+            <a:r>
+              <a:rPr lang="en-US" sz="1600" i="1" dirty="0">
+                <a:solidFill>
+                  <a:schemeClr val="tx1"/>
+                </a:solidFill>
+              </a:rPr>
+              <a:t> vs. </a:t>
+            </a:r>
+            <a:r>
+              <a:rPr lang="en-US" sz="1600" i="1" dirty="0" err="1">
+                <a:solidFill>
+                  <a:schemeClr val="tx1"/>
+                </a:solidFill>
+              </a:rPr>
+              <a:t>PyTorch</a:t>
+            </a:r>
+            <a:r>
+              <a:rPr lang="en-US" sz="1600" i="1" dirty="0">
+                <a:solidFill>
+                  <a:schemeClr val="tx1"/>
+                </a:solidFill>
+              </a:rPr>
+              <a:t>. We are concerned about making the wrong technological choices. </a:t>
             </a:r>
           </a:p>
           <a:p>
             <a:pPr marL="0" indent="0">
               <a:buNone/>
             </a:pPr>
-            <a:endParaRPr lang="en-US" sz="2400" dirty="0">
+            <a:endParaRPr lang="en-US" sz="1600" dirty="0">
               <a:solidFill>
                 <a:schemeClr val="tx1"/>
               </a:solidFill>
@@ -19364,7 +19667,7 @@
               <a:buNone/>
             </a:pPr>
             <a:r>
-              <a:rPr lang="en-US" sz="2400" dirty="0">
+              <a:rPr lang="en-US" sz="1600" dirty="0">
                 <a:solidFill>
                   <a:schemeClr val="tx1"/>
                 </a:solidFill>
@@ -19374,7 +19677,7 @@
           </a:p>
           <a:p>
             <a:r>
-              <a:rPr lang="en-US" sz="2400" dirty="0">
+              <a:rPr lang="en-US" sz="1600" dirty="0">
                 <a:solidFill>
                   <a:schemeClr val="tx1"/>
                 </a:solidFill>
@@ -19382,7 +19685,7 @@
               <a:t>ONNX provides a common model format that can be run within a wide range of environments, without needing the libraries that were used to create the model. For example, if a model is created with </a:t>
             </a:r>
             <a:r>
-              <a:rPr lang="en-US" sz="2400" dirty="0" err="1">
+              <a:rPr lang="en-US" sz="1600" dirty="0" err="1">
                 <a:solidFill>
                   <a:schemeClr val="tx1"/>
                 </a:solidFill>
@@ -19390,7 +19693,7 @@
               <a:t>Keras</a:t>
             </a:r>
             <a:r>
-              <a:rPr lang="en-US" sz="2400" dirty="0">
+              <a:rPr lang="en-US" sz="1600" dirty="0">
                 <a:solidFill>
                   <a:schemeClr val="tx1"/>
                 </a:solidFill>
@@ -19398,7 +19701,7 @@
               <a:t>, they would need neither </a:t>
             </a:r>
             <a:r>
-              <a:rPr lang="en-US" sz="2400" dirty="0" err="1">
+              <a:rPr lang="en-US" sz="1600" dirty="0" err="1">
                 <a:solidFill>
                   <a:schemeClr val="tx1"/>
                 </a:solidFill>
@@ -19406,7 +19709,7 @@
               <a:t>Keras</a:t>
             </a:r>
             <a:r>
-              <a:rPr lang="en-US" sz="2400" dirty="0">
+              <a:rPr lang="en-US" sz="1600" dirty="0">
                 <a:solidFill>
                   <a:schemeClr val="tx1"/>
                 </a:solidFill>
@@ -19416,12 +19719,178 @@
           </a:p>
           <a:p>
             <a:r>
-              <a:rPr lang="en-US" sz="2400" dirty="0">
+              <a:rPr lang="en-US" sz="1600" dirty="0">
                 <a:solidFill>
                   <a:schemeClr val="tx1"/>
                 </a:solidFill>
               </a:rPr>
               <a:t>Because ONNX effectively re-compiles a model when converting to the ONNX format, it may provide some optimizations that improve the scoring performance. In some tests, improvements of 2x on average in the time taken to inference were experienced. </a:t>
+            </a:r>
+          </a:p>
+          <a:p>
+            <a:pPr marL="0" indent="0">
+              <a:buNone/>
+            </a:pPr>
+            <a:endParaRPr lang="en-US" sz="1600" dirty="0">
+              <a:solidFill>
+                <a:schemeClr val="tx1"/>
+              </a:solidFill>
+            </a:endParaRPr>
+          </a:p>
+          <a:p>
+            <a:pPr marL="0" indent="0">
+              <a:buNone/>
+            </a:pPr>
+            <a:r>
+              <a:rPr lang="en-US" sz="1600" dirty="0" err="1">
+                <a:solidFill>
+                  <a:schemeClr val="tx1"/>
+                </a:solidFill>
+              </a:rPr>
+              <a:t>Keras</a:t>
+            </a:r>
+            <a:r>
+              <a:rPr lang="en-US" sz="1600" dirty="0">
+                <a:solidFill>
+                  <a:schemeClr val="tx1"/>
+                </a:solidFill>
+              </a:rPr>
+              <a:t> vs. </a:t>
+            </a:r>
+            <a:r>
+              <a:rPr lang="en-US" sz="1600" dirty="0" err="1">
+                <a:solidFill>
+                  <a:schemeClr val="tx1"/>
+                </a:solidFill>
+              </a:rPr>
+              <a:t>Pytorch</a:t>
+            </a:r>
+            <a:r>
+              <a:rPr lang="en-US" sz="1600" dirty="0">
+                <a:solidFill>
+                  <a:schemeClr val="tx1"/>
+                </a:solidFill>
+              </a:rPr>
+              <a:t> is the subject of much discussion in the community, however the guidance for selecting between </a:t>
+            </a:r>
+            <a:r>
+              <a:rPr lang="en-US" sz="1600" dirty="0" err="1">
+                <a:solidFill>
+                  <a:schemeClr val="tx1"/>
+                </a:solidFill>
+              </a:rPr>
+              <a:t>Keras</a:t>
+            </a:r>
+            <a:r>
+              <a:rPr lang="en-US" sz="1600" dirty="0">
+                <a:solidFill>
+                  <a:schemeClr val="tx1"/>
+                </a:solidFill>
+              </a:rPr>
+              <a:t> and </a:t>
+            </a:r>
+            <a:r>
+              <a:rPr lang="en-US" sz="1600" dirty="0" err="1">
+                <a:solidFill>
+                  <a:schemeClr val="tx1"/>
+                </a:solidFill>
+              </a:rPr>
+              <a:t>PyTorch</a:t>
+            </a:r>
+            <a:r>
+              <a:rPr lang="en-US" sz="1600" dirty="0">
+                <a:solidFill>
+                  <a:schemeClr val="tx1"/>
+                </a:solidFill>
+              </a:rPr>
+              <a:t> boils down to: </a:t>
+            </a:r>
+            <a:r>
+              <a:rPr lang="en-US" sz="1600" dirty="0" err="1">
+                <a:solidFill>
+                  <a:schemeClr val="tx1"/>
+                </a:solidFill>
+              </a:rPr>
+              <a:t>Keras</a:t>
+            </a:r>
+            <a:r>
+              <a:rPr lang="en-US" sz="1600" dirty="0">
+                <a:solidFill>
+                  <a:schemeClr val="tx1"/>
+                </a:solidFill>
+              </a:rPr>
+              <a:t> may be easier to start with and easier to build production grade models, while </a:t>
+            </a:r>
+            <a:r>
+              <a:rPr lang="en-US" sz="1600" dirty="0" err="1">
+                <a:solidFill>
+                  <a:schemeClr val="tx1"/>
+                </a:solidFill>
+              </a:rPr>
+              <a:t>PyTorch</a:t>
+            </a:r>
+            <a:r>
+              <a:rPr lang="en-US" sz="1600" dirty="0">
+                <a:solidFill>
+                  <a:schemeClr val="tx1"/>
+                </a:solidFill>
+              </a:rPr>
+              <a:t> has a steeper initial learning, as it is lower level than </a:t>
+            </a:r>
+            <a:r>
+              <a:rPr lang="en-US" sz="1600" dirty="0" err="1">
+                <a:solidFill>
+                  <a:schemeClr val="tx1"/>
+                </a:solidFill>
+              </a:rPr>
+              <a:t>Keras</a:t>
+            </a:r>
+            <a:r>
+              <a:rPr lang="en-US" sz="1600" dirty="0">
+                <a:solidFill>
+                  <a:schemeClr val="tx1"/>
+                </a:solidFill>
+              </a:rPr>
+              <a:t>, but it offers greater flexibility, faster inferencing and improved </a:t>
+            </a:r>
+            <a:r>
+              <a:rPr lang="en-US" sz="1600" dirty="0" err="1">
+                <a:solidFill>
+                  <a:schemeClr val="tx1"/>
+                </a:solidFill>
+              </a:rPr>
+              <a:t>debugability</a:t>
+            </a:r>
+            <a:r>
+              <a:rPr lang="en-US" sz="1600" dirty="0">
+                <a:solidFill>
+                  <a:schemeClr val="tx1"/>
+                </a:solidFill>
+              </a:rPr>
+              <a:t> in the balance. For a comprehensive comparison, see https://deepsense.ai/keras-or-pytorch/.</a:t>
+            </a:r>
+          </a:p>
+          <a:p>
+            <a:pPr marL="0" indent="0">
+              <a:buNone/>
+            </a:pPr>
+            <a:endParaRPr lang="en-US" sz="1600" dirty="0">
+              <a:solidFill>
+                <a:schemeClr val="tx1"/>
+              </a:solidFill>
+            </a:endParaRPr>
+          </a:p>
+          <a:p>
+            <a:pPr marL="0" indent="0">
+              <a:buNone/>
+            </a:pPr>
+            <a:r>
+              <a:rPr lang="en-US" sz="1600" dirty="0">
+                <a:solidFill>
+                  <a:schemeClr val="tx1"/>
+                </a:solidFill>
+              </a:rPr>
+              <a:t>Finally, the discussion Python vs. ML.NET (C# actually) boils down to the language preferences of developers. Also, see the above-mentioned advantages of ONNX which can effectively bridge the worlds of Python and C#.</a:t>
             </a:r>
           </a:p>
         </p:txBody>
@@ -19538,7 +20007,7 @@
                   <a:schemeClr val="tx1"/>
                 </a:solidFill>
               </a:rPr>
-              <a:t>2.  It seems like data scientists deploy their models as web services from their own python scripts, where as our developers are accustomed to using Azure DevOps to deploy their web services. Can we really have one tool that provides us build and deployment pipelines irrespective of whether we are deploying a model or web application code?</a:t>
+              <a:t>2.  It seems like data scientists deploy their models as web services from their own python scripts, where as our developers are accustomed to using Azure DevOps to deploy their web services. Can we really have one tool that provides us build and deployment pipelines irrespective of whether we are deploying a model or web application code? Also, can we use the same tool to have a unified approach for real-time and batch scoring scenarios?</a:t>
             </a:r>
           </a:p>
           <a:p>
@@ -19561,53 +20030,7 @@
                   <a:schemeClr val="tx1"/>
                 </a:solidFill>
               </a:rPr>
-              <a:t>Yes. Both of these scenarios are supported by Azure DevOps and Azure Pipelines. </a:t>
-            </a:r>
-          </a:p>
-          <a:p>
-            <a:pPr marL="0" indent="0">
-              <a:buNone/>
-            </a:pPr>
-            <a:endParaRPr lang="en-US" sz="2400" dirty="0">
-              <a:solidFill>
-                <a:schemeClr val="tx1"/>
-              </a:solidFill>
-            </a:endParaRPr>
-          </a:p>
-          <a:p>
-            <a:pPr marL="0" indent="0">
-              <a:buNone/>
-            </a:pPr>
-            <a:r>
-              <a:rPr lang="en-US" sz="2400" i="1" dirty="0">
-                <a:solidFill>
-                  <a:schemeClr val="tx1"/>
-                </a:solidFill>
-              </a:rPr>
-              <a:t>3.  Obviously, we can't just have new models automatically deployed into production. What kind of safeguards can we put in place?</a:t>
-            </a:r>
-          </a:p>
-          <a:p>
-            <a:pPr marL="0" indent="0">
-              <a:buNone/>
-            </a:pPr>
-            <a:endParaRPr lang="en-US" sz="2400" dirty="0">
-              <a:solidFill>
-                <a:schemeClr val="tx1"/>
-              </a:solidFill>
-            </a:endParaRPr>
-          </a:p>
-          <a:p>
-            <a:pPr marL="0" indent="0">
-              <a:buNone/>
-            </a:pPr>
-            <a:r>
-              <a:rPr lang="en-US" sz="2400" dirty="0">
-                <a:solidFill>
-                  <a:schemeClr val="tx1"/>
-                </a:solidFill>
-              </a:rPr>
-              <a:t>You can create release pipelines that include pre-approvals that require a person to approve a release before it is deployed into production.</a:t>
+              <a:t>Yes. Both of these scenarios are supported by Azure DevOps and Azure Pipelines. Furthermore, you can use the same combination to automate deployment and operations for both types of scoring scenarios (real-time and batch). </a:t>
             </a:r>
           </a:p>
         </p:txBody>
@@ -19658,7 +20081,7 @@
     </p:spTree>
     <p:extLst>
       <p:ext uri="{BB962C8B-B14F-4D97-AF65-F5344CB8AC3E}">
-        <p14:creationId xmlns:p14="http://schemas.microsoft.com/office/powerpoint/2010/main" val="1508905719"/>
+        <p14:creationId xmlns:p14="http://schemas.microsoft.com/office/powerpoint/2010/main" val="2321267234"/>
       </p:ext>
     </p:extLst>
   </p:cSld>
@@ -19706,7 +20129,7 @@
         <p:spPr>
           <a:xfrm>
             <a:off x="269239" y="1189176"/>
-            <a:ext cx="11653523" cy="5129561"/>
+            <a:ext cx="11653523" cy="5281961"/>
           </a:xfrm>
         </p:spPr>
         <p:txBody>
@@ -19719,49 +20142,59 @@
               <a:buNone/>
             </a:pPr>
             <a:r>
-              <a:rPr lang="en-US" sz="2800" dirty="0">
+              <a:rPr lang="en-US" sz="2400" i="1" dirty="0">
                 <a:solidFill>
                   <a:schemeClr val="tx1"/>
                 </a:solidFill>
               </a:rPr>
-              <a:t>"Not only is Azure enabling faster machine learning and deep learning, but it is giving us powerful tools to manage the entire integration and deployment process that we can use across development and data science uniformly."</a:t>
+              <a:t>3.  Obviously, we can't just have new models automatically deployed into production. What kind of safeguards can we put in place? What kind of support does Azure Machine Learning service have for enterprise security?</a:t>
             </a:r>
           </a:p>
           <a:p>
             <a:pPr marL="0" indent="0">
               <a:buNone/>
             </a:pPr>
-            <a:endParaRPr lang="en-US" sz="2800" dirty="0">
+            <a:endParaRPr lang="en-US" sz="2400" dirty="0">
               <a:solidFill>
                 <a:schemeClr val="tx1"/>
               </a:solidFill>
             </a:endParaRPr>
           </a:p>
           <a:p>
-            <a:pPr marL="0" indent="0" algn="r">
+            <a:pPr marL="0" indent="0">
               <a:buNone/>
             </a:pPr>
             <a:r>
-              <a:rPr lang="en-US" sz="2800" dirty="0">
+              <a:rPr lang="en-US" sz="2400" dirty="0">
                 <a:solidFill>
                   <a:schemeClr val="tx1"/>
                 </a:solidFill>
               </a:rPr>
-              <a:t>- Francine Fischer, CIO of Trey Research</a:t>
+              <a:t>You can create release pipelines that include pre-approvals that require a person to approve a release before it is deployed into production.</a:t>
             </a:r>
           </a:p>
           <a:p>
             <a:pPr marL="0" indent="0">
-              <a:spcAft>
-                <a:spcPts val="882"/>
-              </a:spcAft>
               <a:buNone/>
             </a:pPr>
-            <a:endParaRPr lang="en-US" sz="1400" dirty="0">
+            <a:endParaRPr lang="en-US" sz="2400" dirty="0">
               <a:solidFill>
                 <a:schemeClr val="tx1"/>
               </a:solidFill>
             </a:endParaRPr>
+          </a:p>
+          <a:p>
+            <a:pPr marL="0" indent="0">
+              <a:buNone/>
+            </a:pPr>
+            <a:r>
+              <a:rPr lang="en-US" sz="2400" dirty="0">
+                <a:solidFill>
+                  <a:schemeClr val="tx1"/>
+                </a:solidFill>
+              </a:rPr>
+              <a:t>Azure Machine Learning service has a solid set of features supporting enterprise security including authentication for web service deployment, identity management and authorization, network security (including the use of virtual networks), data encryption, and monitoring. Standard, Azure AD-enabled, user and role management provides support for fine-grained control to Azure Machine Learning service resources. For a detailed overview of enterprise security features, see https://docs.microsoft.com/en-us/azure/machine-learning/service/concept-enterprise-security.</a:t>
+            </a:r>
           </a:p>
         </p:txBody>
       </p:sp>
@@ -19789,7 +20222,7 @@
                 </a:solidFill>
                 <a:cs typeface="Segoe UI" panose="020B0502040204020203" pitchFamily="34" charset="0"/>
               </a:rPr>
-              <a:t>Customer quote</a:t>
+              <a:t>Preferred objections handling</a:t>
             </a:r>
             <a:br>
               <a:rPr lang="en-US" dirty="0">
@@ -19811,7 +20244,7 @@
     </p:spTree>
     <p:extLst>
       <p:ext uri="{BB962C8B-B14F-4D97-AF65-F5344CB8AC3E}">
-        <p14:creationId xmlns:p14="http://schemas.microsoft.com/office/powerpoint/2010/main" val="2584764470"/>
+        <p14:creationId xmlns:p14="http://schemas.microsoft.com/office/powerpoint/2010/main" val="1508905719"/>
       </p:ext>
     </p:extLst>
   </p:cSld>
@@ -19994,6 +20427,697 @@
     <p:extLst>
       <p:ext uri="{BB962C8B-B14F-4D97-AF65-F5344CB8AC3E}">
         <p14:creationId xmlns:p14="http://schemas.microsoft.com/office/powerpoint/2010/main" val="2071289292"/>
+      </p:ext>
+    </p:extLst>
+  </p:cSld>
+  <p:clrMapOvr>
+    <a:masterClrMapping/>
+  </p:clrMapOvr>
+  <mc:AlternateContent xmlns:mc="http://schemas.openxmlformats.org/markup-compatibility/2006" xmlns:p14="http://schemas.microsoft.com/office/powerpoint/2010/main">
+    <mc:Choice Requires="p14">
+      <p:transition p14:dur="0"/>
+    </mc:Choice>
+    <mc:Fallback xmlns="">
+      <p:transition/>
+    </mc:Fallback>
+  </mc:AlternateContent>
+</p:sld>
+</file>
+
+<file path=ppt/slides/slide30.xml><?xml version="1.0" encoding="utf-8"?>
+<p:sld xmlns:a="http://schemas.openxmlformats.org/drawingml/2006/main" xmlns:r="http://schemas.openxmlformats.org/officeDocument/2006/relationships" xmlns:p="http://schemas.openxmlformats.org/presentationml/2006/main">
+  <p:cSld>
+    <p:spTree>
+      <p:nvGrpSpPr>
+        <p:cNvPr id="1" name=""/>
+        <p:cNvGrpSpPr/>
+        <p:nvPr/>
+      </p:nvGrpSpPr>
+      <p:grpSpPr>
+        <a:xfrm>
+          <a:off x="0" y="0"/>
+          <a:ext cx="0" cy="0"/>
+          <a:chOff x="0" y="0"/>
+          <a:chExt cx="0" cy="0"/>
+        </a:xfrm>
+      </p:grpSpPr>
+      <p:sp>
+        <p:nvSpPr>
+          <p:cNvPr id="3" name="Content Placeholder 2"/>
+          <p:cNvSpPr>
+            <a:spLocks noGrp="1"/>
+          </p:cNvSpPr>
+          <p:nvPr>
+            <p:ph type="body" sz="quarter" idx="10"/>
+          </p:nvPr>
+        </p:nvSpPr>
+        <p:spPr>
+          <a:xfrm>
+            <a:off x="269239" y="1189176"/>
+            <a:ext cx="11653523" cy="5281961"/>
+          </a:xfrm>
+        </p:spPr>
+        <p:txBody>
+          <a:bodyPr>
+            <a:noAutofit/>
+          </a:bodyPr>
+          <a:lstStyle/>
+          <a:p>
+            <a:pPr marL="0" indent="0">
+              <a:buNone/>
+            </a:pPr>
+            <a:r>
+              <a:rPr lang="en-US" sz="1600" i="1" dirty="0">
+                <a:solidFill>
+                  <a:schemeClr val="tx1"/>
+                </a:solidFill>
+              </a:rPr>
+              <a:t>4. In the future, we envision providing some of the trained models in devices that are embedded into the manufacturer's assembly lines. Will we need a completely different solution and process for that?</a:t>
+            </a:r>
+          </a:p>
+          <a:p>
+            <a:pPr marL="0" indent="0">
+              <a:buNone/>
+            </a:pPr>
+            <a:endParaRPr lang="en-US" sz="1600" dirty="0">
+              <a:solidFill>
+                <a:schemeClr val="tx1"/>
+              </a:solidFill>
+            </a:endParaRPr>
+          </a:p>
+          <a:p>
+            <a:pPr marL="0" indent="0">
+              <a:buNone/>
+            </a:pPr>
+            <a:r>
+              <a:rPr lang="en-US" sz="1600" dirty="0">
+                <a:solidFill>
+                  <a:schemeClr val="tx1"/>
+                </a:solidFill>
+              </a:rPr>
+              <a:t>No. The integration between Azure Machine Learning and IoT Edge devices provides a solid foundation for such scenarios. Read more at https://docs.microsoft.com/en-us/azure/iot-edge/tutorial-deploy-machine-learning.</a:t>
+            </a:r>
+          </a:p>
+          <a:p>
+            <a:pPr marL="0" indent="0">
+              <a:buNone/>
+            </a:pPr>
+            <a:endParaRPr lang="en-US" sz="1600" dirty="0">
+              <a:solidFill>
+                <a:schemeClr val="tx1"/>
+              </a:solidFill>
+            </a:endParaRPr>
+          </a:p>
+          <a:p>
+            <a:pPr marL="0" indent="0">
+              <a:buNone/>
+            </a:pPr>
+            <a:r>
+              <a:rPr lang="en-US" sz="1600" i="1" dirty="0">
+                <a:solidFill>
+                  <a:schemeClr val="tx1"/>
+                </a:solidFill>
+              </a:rPr>
+              <a:t>5. The business processes of our customers are subject to extensive scrutiny from auditors and regulators. Can we really have traceability through the entire process, including explaining the results produced? On the same note, will be aligned with the principles of responsible AI?</a:t>
+            </a:r>
+          </a:p>
+          <a:p>
+            <a:pPr marL="0" indent="0">
+              <a:buNone/>
+            </a:pPr>
+            <a:endParaRPr lang="en-US" sz="1600" dirty="0">
+              <a:solidFill>
+                <a:schemeClr val="tx1"/>
+              </a:solidFill>
+            </a:endParaRPr>
+          </a:p>
+          <a:p>
+            <a:pPr marL="0" indent="0">
+              <a:buNone/>
+            </a:pPr>
+            <a:r>
+              <a:rPr lang="en-US" sz="1600" dirty="0">
+                <a:solidFill>
+                  <a:schemeClr val="tx1"/>
+                </a:solidFill>
+              </a:rPr>
+              <a:t>Azure DevOps and Azure Machine Learning service are providing excellent out of the box capabilities to support process traceability.</a:t>
+            </a:r>
+          </a:p>
+          <a:p>
+            <a:pPr marL="0" indent="0">
+              <a:buNone/>
+            </a:pPr>
+            <a:r>
+              <a:rPr lang="en-US" sz="1600" dirty="0">
+                <a:solidFill>
+                  <a:schemeClr val="tx1"/>
+                </a:solidFill>
+              </a:rPr>
+              <a:t>The AML Python SDK has support for model explainability (both global and local).</a:t>
+            </a:r>
+          </a:p>
+          <a:p>
+            <a:pPr marL="0" indent="0">
+              <a:buNone/>
+            </a:pPr>
+            <a:endParaRPr lang="en-US" sz="1600" dirty="0">
+              <a:solidFill>
+                <a:schemeClr val="tx1"/>
+              </a:solidFill>
+            </a:endParaRPr>
+          </a:p>
+          <a:p>
+            <a:pPr marL="0" indent="0">
+              <a:buNone/>
+            </a:pPr>
+            <a:r>
+              <a:rPr lang="en-US" sz="1600" dirty="0">
+                <a:solidFill>
+                  <a:schemeClr val="tx1"/>
+                </a:solidFill>
+              </a:rPr>
+              <a:t>The context and the models developed by Trey Research are fully aligned with the core principles of responsible AI:</a:t>
+            </a:r>
+          </a:p>
+          <a:p>
+            <a:pPr marL="0" indent="0">
+              <a:buNone/>
+            </a:pPr>
+            <a:r>
+              <a:rPr lang="en-US" sz="1600" dirty="0">
+                <a:solidFill>
+                  <a:schemeClr val="tx1"/>
+                </a:solidFill>
+              </a:rPr>
+              <a:t>    - Fairness</a:t>
+            </a:r>
+          </a:p>
+          <a:p>
+            <a:pPr marL="0" indent="0">
+              <a:buNone/>
+            </a:pPr>
+            <a:r>
+              <a:rPr lang="en-US" sz="1600" dirty="0">
+                <a:solidFill>
+                  <a:schemeClr val="tx1"/>
+                </a:solidFill>
+              </a:rPr>
+              <a:t>    - Inclusiveness</a:t>
+            </a:r>
+          </a:p>
+          <a:p>
+            <a:pPr marL="0" indent="0">
+              <a:buNone/>
+            </a:pPr>
+            <a:r>
+              <a:rPr lang="en-US" sz="1600" dirty="0">
+                <a:solidFill>
+                  <a:schemeClr val="tx1"/>
+                </a:solidFill>
+              </a:rPr>
+              <a:t>    - Reliability and safety</a:t>
+            </a:r>
+          </a:p>
+          <a:p>
+            <a:pPr marL="0" indent="0">
+              <a:buNone/>
+            </a:pPr>
+            <a:r>
+              <a:rPr lang="en-US" sz="1600" dirty="0">
+                <a:solidFill>
+                  <a:schemeClr val="tx1"/>
+                </a:solidFill>
+              </a:rPr>
+              <a:t>    - Transparency</a:t>
+            </a:r>
+          </a:p>
+          <a:p>
+            <a:pPr marL="0" indent="0">
+              <a:buNone/>
+            </a:pPr>
+            <a:r>
+              <a:rPr lang="en-US" sz="1600" dirty="0">
+                <a:solidFill>
+                  <a:schemeClr val="tx1"/>
+                </a:solidFill>
+              </a:rPr>
+              <a:t>    - Privacy and security</a:t>
+            </a:r>
+          </a:p>
+          <a:p>
+            <a:pPr marL="0" indent="0">
+              <a:buNone/>
+            </a:pPr>
+            <a:r>
+              <a:rPr lang="en-US" sz="1600" dirty="0">
+                <a:solidFill>
+                  <a:schemeClr val="tx1"/>
+                </a:solidFill>
+              </a:rPr>
+              <a:t>    - Accountability</a:t>
+            </a:r>
+          </a:p>
+          <a:p>
+            <a:pPr marL="0" indent="0">
+              <a:buNone/>
+            </a:pPr>
+            <a:r>
+              <a:rPr lang="en-US" sz="1600" dirty="0">
+                <a:solidFill>
+                  <a:schemeClr val="tx1"/>
+                </a:solidFill>
+              </a:rPr>
+              <a:t>The details about Microsoft's approach to AI are available at https://www.microsoft.com/en-us/ai/our-approach-to-ai.</a:t>
+            </a:r>
+          </a:p>
+        </p:txBody>
+      </p:sp>
+      <p:sp>
+        <p:nvSpPr>
+          <p:cNvPr id="2" name="Title 1"/>
+          <p:cNvSpPr>
+            <a:spLocks noGrp="1"/>
+          </p:cNvSpPr>
+          <p:nvPr>
+            <p:ph type="title"/>
+          </p:nvPr>
+        </p:nvSpPr>
+        <p:spPr/>
+        <p:txBody>
+          <a:bodyPr>
+            <a:normAutofit fontScale="90000"/>
+          </a:bodyPr>
+          <a:lstStyle/>
+          <a:p>
+            <a:r>
+              <a:rPr lang="en-US" sz="4900" dirty="0">
+                <a:solidFill>
+                  <a:schemeClr val="tx1"/>
+                </a:solidFill>
+                <a:cs typeface="Segoe UI" panose="020B0502040204020203" pitchFamily="34" charset="0"/>
+              </a:rPr>
+              <a:t>Preferred objections handling</a:t>
+            </a:r>
+            <a:br>
+              <a:rPr lang="en-US" dirty="0">
+                <a:solidFill>
+                  <a:schemeClr val="tx1"/>
+                </a:solidFill>
+                <a:latin typeface="Segoe UI" panose="020B0502040204020203" pitchFamily="34" charset="0"/>
+              </a:rPr>
+            </a:br>
+            <a:endParaRPr lang="en-US" sz="3236" dirty="0">
+              <a:solidFill>
+                <a:schemeClr val="tx1"/>
+              </a:solidFill>
+              <a:latin typeface="Segoe UI" panose="020B0502040204020203" pitchFamily="34" charset="0"/>
+            </a:endParaRPr>
+          </a:p>
+        </p:txBody>
+      </p:sp>
+    </p:spTree>
+    <p:extLst>
+      <p:ext uri="{BB962C8B-B14F-4D97-AF65-F5344CB8AC3E}">
+        <p14:creationId xmlns:p14="http://schemas.microsoft.com/office/powerpoint/2010/main" val="225661420"/>
+      </p:ext>
+    </p:extLst>
+  </p:cSld>
+  <p:clrMapOvr>
+    <a:masterClrMapping/>
+  </p:clrMapOvr>
+  <mc:AlternateContent xmlns:mc="http://schemas.openxmlformats.org/markup-compatibility/2006" xmlns:p14="http://schemas.microsoft.com/office/powerpoint/2010/main">
+    <mc:Choice Requires="p14">
+      <p:transition p14:dur="0"/>
+    </mc:Choice>
+    <mc:Fallback xmlns="">
+      <p:transition/>
+    </mc:Fallback>
+  </mc:AlternateContent>
+</p:sld>
+</file>
+
+<file path=ppt/slides/slide31.xml><?xml version="1.0" encoding="utf-8"?>
+<p:sld xmlns:a="http://schemas.openxmlformats.org/drawingml/2006/main" xmlns:r="http://schemas.openxmlformats.org/officeDocument/2006/relationships" xmlns:p="http://schemas.openxmlformats.org/presentationml/2006/main">
+  <p:cSld>
+    <p:spTree>
+      <p:nvGrpSpPr>
+        <p:cNvPr id="1" name=""/>
+        <p:cNvGrpSpPr/>
+        <p:nvPr/>
+      </p:nvGrpSpPr>
+      <p:grpSpPr>
+        <a:xfrm>
+          <a:off x="0" y="0"/>
+          <a:ext cx="0" cy="0"/>
+          <a:chOff x="0" y="0"/>
+          <a:chExt cx="0" cy="0"/>
+        </a:xfrm>
+      </p:grpSpPr>
+      <p:sp>
+        <p:nvSpPr>
+          <p:cNvPr id="3" name="Content Placeholder 2"/>
+          <p:cNvSpPr>
+            <a:spLocks noGrp="1"/>
+          </p:cNvSpPr>
+          <p:nvPr>
+            <p:ph type="body" sz="quarter" idx="10"/>
+          </p:nvPr>
+        </p:nvSpPr>
+        <p:spPr>
+          <a:xfrm>
+            <a:off x="269239" y="1189176"/>
+            <a:ext cx="11653523" cy="5281961"/>
+          </a:xfrm>
+        </p:spPr>
+        <p:txBody>
+          <a:bodyPr>
+            <a:noAutofit/>
+          </a:bodyPr>
+          <a:lstStyle/>
+          <a:p>
+            <a:pPr marL="0" indent="0">
+              <a:buNone/>
+            </a:pPr>
+            <a:r>
+              <a:rPr lang="en-US" sz="1600" i="1" dirty="0">
+                <a:solidFill>
+                  <a:schemeClr val="tx1"/>
+                </a:solidFill>
+              </a:rPr>
+              <a:t>6. We have heard Azure Machine Learning service supports automated machine learning. Can we incorporate automated ML in an end-to-end DevOps pipeline? </a:t>
+            </a:r>
+          </a:p>
+          <a:p>
+            <a:pPr marL="0" indent="0">
+              <a:buNone/>
+            </a:pPr>
+            <a:endParaRPr lang="en-US" sz="1600" dirty="0">
+              <a:solidFill>
+                <a:schemeClr val="tx1"/>
+              </a:solidFill>
+            </a:endParaRPr>
+          </a:p>
+          <a:p>
+            <a:pPr marL="0" indent="0">
+              <a:buNone/>
+            </a:pPr>
+            <a:r>
+              <a:rPr lang="en-US" sz="1600" dirty="0">
+                <a:solidFill>
+                  <a:schemeClr val="tx1"/>
+                </a:solidFill>
+              </a:rPr>
+              <a:t>Automated machine learning in Azure Machine Learning service helps to simplify and expedite the process of producing a performant model. It does this by trying many combinations of best practice data preparation (automated pre-processing and featurization), algorithm selection and algorithm parameters (hyper-parameter tuning) while asking the user only for some relatively simple configuration information (such as the type of prediction problem, the input training data set, the feature to predict and the compute resources on which to experiment) to perform the job. Be aware though that automated ML currently only supports classic machine learning algorithms and not deep learning approaches.</a:t>
+            </a:r>
+          </a:p>
+          <a:p>
+            <a:pPr marL="0" indent="0">
+              <a:buNone/>
+            </a:pPr>
+            <a:endParaRPr lang="en-US" sz="1600" dirty="0">
+              <a:solidFill>
+                <a:schemeClr val="tx1"/>
+              </a:solidFill>
+            </a:endParaRPr>
+          </a:p>
+          <a:p>
+            <a:pPr marL="0" indent="0">
+              <a:buNone/>
+            </a:pPr>
+            <a:r>
+              <a:rPr lang="en-US" sz="1600" dirty="0">
+                <a:solidFill>
+                  <a:schemeClr val="tx1"/>
+                </a:solidFill>
+              </a:rPr>
+              <a:t>Through the Python SDK, the automated ML capabilities can be fully integrated into DevOps pipelines.</a:t>
+            </a:r>
+          </a:p>
+          <a:p>
+            <a:pPr marL="0" indent="0">
+              <a:buNone/>
+            </a:pPr>
+            <a:endParaRPr lang="en-US" sz="1600" dirty="0">
+              <a:solidFill>
+                <a:schemeClr val="tx1"/>
+              </a:solidFill>
+            </a:endParaRPr>
+          </a:p>
+          <a:p>
+            <a:pPr marL="0" indent="0">
+              <a:buNone/>
+            </a:pPr>
+            <a:r>
+              <a:rPr lang="en-US" sz="1600" i="1" dirty="0">
+                <a:solidFill>
+                  <a:schemeClr val="tx1"/>
+                </a:solidFill>
+              </a:rPr>
+              <a:t>7. Some of our team has worked with Azure Databricks (trained a few models in Spark </a:t>
+            </a:r>
+            <a:r>
+              <a:rPr lang="en-US" sz="1600" i="1" dirty="0" err="1">
+                <a:solidFill>
+                  <a:schemeClr val="tx1"/>
+                </a:solidFill>
+              </a:rPr>
+              <a:t>MLlib</a:t>
+            </a:r>
+            <a:r>
+              <a:rPr lang="en-US" sz="1600" i="1" dirty="0">
+                <a:solidFill>
+                  <a:schemeClr val="tx1"/>
+                </a:solidFill>
+              </a:rPr>
+              <a:t>), and they are confused by the overlap with Azure Machine Learning service. How should we be thinking about when to use which?</a:t>
+            </a:r>
+          </a:p>
+          <a:p>
+            <a:pPr marL="0" indent="0">
+              <a:buNone/>
+            </a:pPr>
+            <a:endParaRPr lang="en-US" sz="1600" i="1" dirty="0">
+              <a:solidFill>
+                <a:schemeClr val="tx1"/>
+              </a:solidFill>
+            </a:endParaRPr>
+          </a:p>
+          <a:p>
+            <a:pPr marL="0" indent="0">
+              <a:buNone/>
+            </a:pPr>
+            <a:r>
+              <a:rPr lang="en-US" sz="1600" dirty="0">
+                <a:solidFill>
+                  <a:schemeClr val="tx1"/>
+                </a:solidFill>
+              </a:rPr>
+              <a:t>Consider using both. The best way to think about the relationship between Azure Databricks and Azure Machine Learning service is that Azure Databricks provides the tools for data engineers and data scientists to author their data and machine learning pipelines as well as the compute that powers these, and Azure Machine Learning service provides the platform that formalizes the modeling process by capturing data about training runs, versioning pipelines and models and assisting with the deployment of models as web services.</a:t>
+            </a:r>
+          </a:p>
+        </p:txBody>
+      </p:sp>
+      <p:sp>
+        <p:nvSpPr>
+          <p:cNvPr id="2" name="Title 1"/>
+          <p:cNvSpPr>
+            <a:spLocks noGrp="1"/>
+          </p:cNvSpPr>
+          <p:nvPr>
+            <p:ph type="title"/>
+          </p:nvPr>
+        </p:nvSpPr>
+        <p:spPr/>
+        <p:txBody>
+          <a:bodyPr>
+            <a:normAutofit fontScale="90000"/>
+          </a:bodyPr>
+          <a:lstStyle/>
+          <a:p>
+            <a:r>
+              <a:rPr lang="en-US" sz="4900" dirty="0">
+                <a:solidFill>
+                  <a:schemeClr val="tx1"/>
+                </a:solidFill>
+                <a:cs typeface="Segoe UI" panose="020B0502040204020203" pitchFamily="34" charset="0"/>
+              </a:rPr>
+              <a:t>Preferred objections handling</a:t>
+            </a:r>
+            <a:br>
+              <a:rPr lang="en-US" dirty="0">
+                <a:solidFill>
+                  <a:schemeClr val="tx1"/>
+                </a:solidFill>
+                <a:latin typeface="Segoe UI" panose="020B0502040204020203" pitchFamily="34" charset="0"/>
+              </a:rPr>
+            </a:br>
+            <a:endParaRPr lang="en-US" sz="3236" dirty="0">
+              <a:solidFill>
+                <a:schemeClr val="tx1"/>
+              </a:solidFill>
+              <a:latin typeface="Segoe UI" panose="020B0502040204020203" pitchFamily="34" charset="0"/>
+            </a:endParaRPr>
+          </a:p>
+        </p:txBody>
+      </p:sp>
+    </p:spTree>
+    <p:extLst>
+      <p:ext uri="{BB962C8B-B14F-4D97-AF65-F5344CB8AC3E}">
+        <p14:creationId xmlns:p14="http://schemas.microsoft.com/office/powerpoint/2010/main" val="141182091"/>
+      </p:ext>
+    </p:extLst>
+  </p:cSld>
+  <p:clrMapOvr>
+    <a:masterClrMapping/>
+  </p:clrMapOvr>
+  <mc:AlternateContent xmlns:mc="http://schemas.openxmlformats.org/markup-compatibility/2006" xmlns:p14="http://schemas.microsoft.com/office/powerpoint/2010/main">
+    <mc:Choice Requires="p14">
+      <p:transition p14:dur="0"/>
+    </mc:Choice>
+    <mc:Fallback xmlns="">
+      <p:transition/>
+    </mc:Fallback>
+  </mc:AlternateContent>
+</p:sld>
+</file>
+
+<file path=ppt/slides/slide32.xml><?xml version="1.0" encoding="utf-8"?>
+<p:sld xmlns:a="http://schemas.openxmlformats.org/drawingml/2006/main" xmlns:r="http://schemas.openxmlformats.org/officeDocument/2006/relationships" xmlns:p="http://schemas.openxmlformats.org/presentationml/2006/main">
+  <p:cSld>
+    <p:spTree>
+      <p:nvGrpSpPr>
+        <p:cNvPr id="1" name=""/>
+        <p:cNvGrpSpPr/>
+        <p:nvPr/>
+      </p:nvGrpSpPr>
+      <p:grpSpPr>
+        <a:xfrm>
+          <a:off x="0" y="0"/>
+          <a:ext cx="0" cy="0"/>
+          <a:chOff x="0" y="0"/>
+          <a:chExt cx="0" cy="0"/>
+        </a:xfrm>
+      </p:grpSpPr>
+      <p:sp>
+        <p:nvSpPr>
+          <p:cNvPr id="3" name="Content Placeholder 2"/>
+          <p:cNvSpPr>
+            <a:spLocks noGrp="1"/>
+          </p:cNvSpPr>
+          <p:nvPr>
+            <p:ph type="body" sz="quarter" idx="10"/>
+          </p:nvPr>
+        </p:nvSpPr>
+        <p:spPr>
+          <a:xfrm>
+            <a:off x="269239" y="1189176"/>
+            <a:ext cx="11653523" cy="5129561"/>
+          </a:xfrm>
+        </p:spPr>
+        <p:txBody>
+          <a:bodyPr>
+            <a:noAutofit/>
+          </a:bodyPr>
+          <a:lstStyle/>
+          <a:p>
+            <a:pPr marL="0" indent="0">
+              <a:buNone/>
+            </a:pPr>
+            <a:r>
+              <a:rPr lang="en-US" sz="2800" dirty="0">
+                <a:solidFill>
+                  <a:schemeClr val="tx1"/>
+                </a:solidFill>
+              </a:rPr>
+              <a:t>"Not only is Azure enabling faster machine learning and deep learning, but it is giving us powerful tools to manage the entire integration and deployment process that we can use across development and data science uniformly."</a:t>
+            </a:r>
+          </a:p>
+          <a:p>
+            <a:pPr marL="0" indent="0">
+              <a:buNone/>
+            </a:pPr>
+            <a:endParaRPr lang="en-US" sz="2800" dirty="0">
+              <a:solidFill>
+                <a:schemeClr val="tx1"/>
+              </a:solidFill>
+            </a:endParaRPr>
+          </a:p>
+          <a:p>
+            <a:pPr marL="0" indent="0" algn="r">
+              <a:buNone/>
+            </a:pPr>
+            <a:r>
+              <a:rPr lang="en-US" sz="2800" dirty="0">
+                <a:solidFill>
+                  <a:schemeClr val="tx1"/>
+                </a:solidFill>
+              </a:rPr>
+              <a:t>- Francine Fischer, CIO of Trey Research</a:t>
+            </a:r>
+          </a:p>
+          <a:p>
+            <a:pPr marL="0" indent="0">
+              <a:spcAft>
+                <a:spcPts val="882"/>
+              </a:spcAft>
+              <a:buNone/>
+            </a:pPr>
+            <a:endParaRPr lang="en-US" sz="1400" dirty="0">
+              <a:solidFill>
+                <a:schemeClr val="tx1"/>
+              </a:solidFill>
+            </a:endParaRPr>
+          </a:p>
+        </p:txBody>
+      </p:sp>
+      <p:sp>
+        <p:nvSpPr>
+          <p:cNvPr id="2" name="Title 1"/>
+          <p:cNvSpPr>
+            <a:spLocks noGrp="1"/>
+          </p:cNvSpPr>
+          <p:nvPr>
+            <p:ph type="title"/>
+          </p:nvPr>
+        </p:nvSpPr>
+        <p:spPr/>
+        <p:txBody>
+          <a:bodyPr>
+            <a:normAutofit fontScale="90000"/>
+          </a:bodyPr>
+          <a:lstStyle/>
+          <a:p>
+            <a:r>
+              <a:rPr lang="en-US" sz="4900" dirty="0">
+                <a:solidFill>
+                  <a:schemeClr val="tx1"/>
+                </a:solidFill>
+                <a:cs typeface="Segoe UI" panose="020B0502040204020203" pitchFamily="34" charset="0"/>
+              </a:rPr>
+              <a:t>Customer quote</a:t>
+            </a:r>
+            <a:br>
+              <a:rPr lang="en-US" dirty="0">
+                <a:solidFill>
+                  <a:schemeClr val="tx1"/>
+                </a:solidFill>
+                <a:latin typeface="Segoe UI" panose="020B0502040204020203" pitchFamily="34" charset="0"/>
+              </a:rPr>
+            </a:br>
+            <a:endParaRPr lang="en-US" sz="3236" dirty="0">
+              <a:solidFill>
+                <a:schemeClr val="tx1"/>
+              </a:solidFill>
+              <a:latin typeface="Segoe UI" panose="020B0502040204020203" pitchFamily="34" charset="0"/>
+            </a:endParaRPr>
+          </a:p>
+        </p:txBody>
+      </p:sp>
+    </p:spTree>
+    <p:extLst>
+      <p:ext uri="{BB962C8B-B14F-4D97-AF65-F5344CB8AC3E}">
+        <p14:creationId xmlns:p14="http://schemas.microsoft.com/office/powerpoint/2010/main" val="2584764470"/>
       </p:ext>
     </p:extLst>
   </p:cSld>
@@ -21845,15 +22969,6 @@
 </file>
 
 <file path=customXml/item1.xml><?xml version="1.0" encoding="utf-8"?>
-<?mso-contentType ?>
-<FormTemplates xmlns="http://schemas.microsoft.com/sharepoint/v3/contenttype/forms">
-  <Display>DocumentLibraryForm</Display>
-  <Edit>DocumentLibraryForm</Edit>
-  <New>DocumentLibraryForm</New>
-</FormTemplates>
-</file>
-
-<file path=customXml/item2.xml><?xml version="1.0" encoding="utf-8"?>
 <ct:contentTypeSchema xmlns:ct="http://schemas.microsoft.com/office/2006/metadata/contentType" xmlns:ma="http://schemas.microsoft.com/office/2006/metadata/properties/metaAttributes" ct:_="" ma:_="" ma:contentTypeName="Document" ma:contentTypeID="0x010100D15DFA3690A15B4081582BBCC6BEAC3E" ma:contentTypeVersion="9" ma:contentTypeDescription="Create a new document." ma:contentTypeScope="" ma:versionID="642da1784587cbe85a7fdbbe4dc36103">
   <xsd:schema xmlns:xsd="http://www.w3.org/2001/XMLSchema" xmlns:xs="http://www.w3.org/2001/XMLSchema" xmlns:p="http://schemas.microsoft.com/office/2006/metadata/properties" xmlns:ns1="http://schemas.microsoft.com/sharepoint/v3" xmlns:ns2="2023ac63-7b75-4916-a9ee-591457758eee" xmlns:ns3="d9c797ad-d7c3-4982-82b7-81352a75e4a5" targetNamespace="http://schemas.microsoft.com/office/2006/metadata/properties" ma:root="true" ma:fieldsID="91198b0246576053cc55dd2c67035a89" ns1:_="" ns2:_="" ns3:_="">
     <xsd:import namespace="http://schemas.microsoft.com/sharepoint/v3"/>
@@ -22055,6 +23170,15 @@
 </ct:contentTypeSchema>
 </file>
 
+<file path=customXml/item2.xml><?xml version="1.0" encoding="utf-8"?>
+<?mso-contentType ?>
+<FormTemplates xmlns="http://schemas.microsoft.com/sharepoint/v3/contenttype/forms">
+  <Display>DocumentLibraryForm</Display>
+  <Edit>DocumentLibraryForm</Edit>
+  <New>DocumentLibraryForm</New>
+</FormTemplates>
+</file>
+
 <file path=customXml/item3.xml><?xml version="1.0" encoding="utf-8"?>
 <p:properties xmlns:p="http://schemas.microsoft.com/office/2006/metadata/properties" xmlns:xsi="http://www.w3.org/2001/XMLSchema-instance" xmlns:pc="http://schemas.microsoft.com/office/infopath/2007/PartnerControls">
   <documentManagement>
@@ -22065,14 +23189,6 @@
 </file>
 
 <file path=customXml/itemProps1.xml><?xml version="1.0" encoding="utf-8"?>
-<ds:datastoreItem xmlns:ds="http://schemas.openxmlformats.org/officeDocument/2006/customXml" ds:itemID="{F18501AF-04CF-4482-BAE1-607B49DDC378}">
-  <ds:schemaRefs>
-    <ds:schemaRef ds:uri="http://schemas.microsoft.com/sharepoint/v3/contenttype/forms"/>
-  </ds:schemaRefs>
-</ds:datastoreItem>
-</file>
-
-<file path=customXml/itemProps2.xml><?xml version="1.0" encoding="utf-8"?>
 <ds:datastoreItem xmlns:ds="http://schemas.openxmlformats.org/officeDocument/2006/customXml" ds:itemID="{255F5BEB-6AD6-480A-8556-C80C5EBC10F2}">
   <ds:schemaRefs>
     <ds:schemaRef ds:uri="http://schemas.microsoft.com/office/2006/metadata/contentType"/>
@@ -22088,6 +23204,14 @@
     <ds:schemaRef ds:uri="http://purl.org/dc/elements/1.1/"/>
     <ds:schemaRef ds:uri="http://purl.org/dc/terms/"/>
     <ds:schemaRef ds:uri="http://schemas.microsoft.com/internal/obd"/>
+  </ds:schemaRefs>
+</ds:datastoreItem>
+</file>
+
+<file path=customXml/itemProps2.xml><?xml version="1.0" encoding="utf-8"?>
+<ds:datastoreItem xmlns:ds="http://schemas.openxmlformats.org/officeDocument/2006/customXml" ds:itemID="{F18501AF-04CF-4482-BAE1-607B49DDC378}">
+  <ds:schemaRefs>
+    <ds:schemaRef ds:uri="http://schemas.microsoft.com/sharepoint/v3/contenttype/forms"/>
   </ds:schemaRefs>
 </ds:datastoreItem>
 </file>

</xml_diff>